<commit_message>
added personal contact information on slides
</commit_message>
<xml_diff>
--- a/slides/ASL-2020-01.pptx
+++ b/slides/ASL-2020-01.pptx
@@ -34933,6 +34933,16 @@
               <a:rPr lang="it-IT" dirty="0" err="1"/>
               <a:t>Engineer</a:t>
             </a:r>
+            <a:br>
+              <a:rPr lang="it-IT" dirty="0"/>
+            </a:br>
+            <a:r>
+              <a:rPr lang="it-IT" dirty="0" err="1"/>
+              <a:t>valerio.riva@it.ibm.com</a:t>
+            </a:r>
+            <a:br>
+              <a:rPr lang="it-IT" dirty="0"/>
+            </a:br>
             <a:endParaRPr lang="it-IT" dirty="0"/>
           </a:p>
         </p:txBody>

</xml_diff>